<commit_message>
Updated visualisation, uploading astropy here
</commit_message>
<xml_diff>
--- a/content/lectures/Introduction.pptx
+++ b/content/lectures/Introduction.pptx
@@ -6,17 +6,18 @@
   </p:sldMasterIdLst>
   <p:sldIdLst>
     <p:sldId id="256" r:id="rId2"/>
-    <p:sldId id="257" r:id="rId3"/>
-    <p:sldId id="258" r:id="rId4"/>
-    <p:sldId id="259" r:id="rId5"/>
-    <p:sldId id="260" r:id="rId6"/>
-    <p:sldId id="261" r:id="rId7"/>
-    <p:sldId id="262" r:id="rId8"/>
-    <p:sldId id="263" r:id="rId9"/>
-    <p:sldId id="267" r:id="rId10"/>
-    <p:sldId id="268" r:id="rId11"/>
-    <p:sldId id="265" r:id="rId12"/>
-    <p:sldId id="264" r:id="rId13"/>
+    <p:sldId id="269" r:id="rId3"/>
+    <p:sldId id="257" r:id="rId4"/>
+    <p:sldId id="258" r:id="rId5"/>
+    <p:sldId id="259" r:id="rId6"/>
+    <p:sldId id="260" r:id="rId7"/>
+    <p:sldId id="261" r:id="rId8"/>
+    <p:sldId id="262" r:id="rId9"/>
+    <p:sldId id="263" r:id="rId10"/>
+    <p:sldId id="267" r:id="rId11"/>
+    <p:sldId id="268" r:id="rId12"/>
+    <p:sldId id="265" r:id="rId13"/>
+    <p:sldId id="264" r:id="rId14"/>
   </p:sldIdLst>
   <p:sldSz cx="12192000" cy="6858000"/>
   <p:notesSz cx="6858000" cy="9144000"/>
@@ -3416,6 +3417,500 @@
           <a:chExt cx="0" cy="0"/>
         </a:xfrm>
       </p:grpSpPr>
+      <p:sp>
+        <p:nvSpPr>
+          <p:cNvPr id="2" name="Title 1">
+            <a:extLst>
+              <a:ext uri="{FF2B5EF4-FFF2-40B4-BE49-F238E27FC236}">
+                <a16:creationId xmlns:a16="http://schemas.microsoft.com/office/drawing/2014/main" id="{C325B7C7-7599-801A-DEED-FB0A0A7953BE}"/>
+              </a:ext>
+            </a:extLst>
+          </p:cNvPr>
+          <p:cNvSpPr>
+            <a:spLocks noGrp="1"/>
+          </p:cNvSpPr>
+          <p:nvPr>
+            <p:ph type="title"/>
+          </p:nvPr>
+        </p:nvSpPr>
+        <p:spPr/>
+        <p:txBody>
+          <a:bodyPr/>
+          <a:lstStyle/>
+          <a:p>
+            <a:r>
+              <a:rPr lang="en-US" dirty="0"/>
+              <a:t>Course structure</a:t>
+            </a:r>
+          </a:p>
+        </p:txBody>
+      </p:sp>
+      <p:sp>
+        <p:nvSpPr>
+          <p:cNvPr id="3" name="Content Placeholder 2">
+            <a:extLst>
+              <a:ext uri="{FF2B5EF4-FFF2-40B4-BE49-F238E27FC236}">
+                <a16:creationId xmlns:a16="http://schemas.microsoft.com/office/drawing/2014/main" id="{55B83267-B33C-B929-8DA0-22CE6B5FCDED}"/>
+              </a:ext>
+            </a:extLst>
+          </p:cNvPr>
+          <p:cNvSpPr>
+            <a:spLocks noGrp="1"/>
+          </p:cNvSpPr>
+          <p:nvPr>
+            <p:ph idx="1"/>
+          </p:nvPr>
+        </p:nvSpPr>
+        <p:spPr/>
+        <p:txBody>
+          <a:bodyPr/>
+          <a:lstStyle/>
+          <a:p>
+            <a:r>
+              <a:rPr lang="en-US" dirty="0"/>
+              <a:t>We will be using </a:t>
+            </a:r>
+            <a:r>
+              <a:rPr lang="en-US" dirty="0" err="1"/>
+              <a:t>JupyterLab</a:t>
+            </a:r>
+            <a:r>
+              <a:rPr lang="en-US" dirty="0"/>
+              <a:t> up until day 4.</a:t>
+            </a:r>
+          </a:p>
+          <a:p>
+            <a:pPr lvl="1"/>
+            <a:r>
+              <a:rPr lang="en-US" dirty="0"/>
+              <a:t>Either </a:t>
+            </a:r>
+            <a:r>
+              <a:rPr lang="en-US" dirty="0" err="1"/>
+              <a:t>Pyodide</a:t>
+            </a:r>
+            <a:r>
+              <a:rPr lang="en-US" dirty="0"/>
+              <a:t> or your own install can be used</a:t>
+            </a:r>
+          </a:p>
+          <a:p>
+            <a:pPr lvl="1"/>
+            <a:r>
+              <a:rPr lang="en-US" dirty="0"/>
+              <a:t>All but 2 notebooks work using </a:t>
+            </a:r>
+            <a:r>
+              <a:rPr lang="en-US" dirty="0" err="1"/>
+              <a:t>pyodide</a:t>
+            </a:r>
+            <a:r>
+              <a:rPr lang="en-US" dirty="0"/>
+              <a:t>.</a:t>
+            </a:r>
+          </a:p>
+          <a:p>
+            <a:r>
+              <a:rPr lang="en-US" dirty="0"/>
+              <a:t>From day 4 we will teach project development.</a:t>
+            </a:r>
+          </a:p>
+          <a:p>
+            <a:r>
+              <a:rPr lang="en-US" dirty="0"/>
+              <a:t>Last day we will build a project from scratch.</a:t>
+            </a:r>
+          </a:p>
+          <a:p>
+            <a:r>
+              <a:rPr lang="en-US" dirty="0"/>
+              <a:t>Each day except the last will have a 30 minute question session at the end.</a:t>
+            </a:r>
+          </a:p>
+          <a:p>
+            <a:r>
+              <a:rPr lang="en-US" dirty="0"/>
+              <a:t>Schedule is flexible depending on demand for certain topics.</a:t>
+            </a:r>
+          </a:p>
+          <a:p>
+            <a:endParaRPr lang="en-US" dirty="0"/>
+          </a:p>
+          <a:p>
+            <a:endParaRPr lang="en-US" dirty="0"/>
+          </a:p>
+        </p:txBody>
+      </p:sp>
+    </p:spTree>
+    <p:extLst>
+      <p:ext uri="{BB962C8B-B14F-4D97-AF65-F5344CB8AC3E}">
+        <p14:creationId xmlns:p14="http://schemas.microsoft.com/office/powerpoint/2010/main" val="591396260"/>
+      </p:ext>
+    </p:extLst>
+  </p:cSld>
+  <p:clrMapOvr>
+    <a:masterClrMapping/>
+  </p:clrMapOvr>
+  <p:timing>
+    <p:tnLst>
+      <p:par>
+        <p:cTn id="1" dur="indefinite" restart="never" nodeType="tmRoot">
+          <p:childTnLst>
+            <p:seq concurrent="1" nextAc="seek">
+              <p:cTn id="2" dur="indefinite" nodeType="mainSeq">
+                <p:childTnLst>
+                  <p:par>
+                    <p:cTn id="3" fill="hold">
+                      <p:stCondLst>
+                        <p:cond delay="indefinite"/>
+                      </p:stCondLst>
+                      <p:childTnLst>
+                        <p:par>
+                          <p:cTn id="4" fill="hold">
+                            <p:stCondLst>
+                              <p:cond delay="0"/>
+                            </p:stCondLst>
+                            <p:childTnLst>
+                              <p:par>
+                                <p:cTn id="5" presetID="1" presetClass="entr" presetSubtype="0" fill="hold" grpId="0" nodeType="clickEffect">
+                                  <p:stCondLst>
+                                    <p:cond delay="0"/>
+                                  </p:stCondLst>
+                                  <p:childTnLst>
+                                    <p:set>
+                                      <p:cBhvr>
+                                        <p:cTn id="6" dur="1" fill="hold">
+                                          <p:stCondLst>
+                                            <p:cond delay="0"/>
+                                          </p:stCondLst>
+                                        </p:cTn>
+                                        <p:tgtEl>
+                                          <p:spTgt spid="3">
+                                            <p:txEl>
+                                              <p:pRg st="0" end="0"/>
+                                            </p:txEl>
+                                          </p:spTgt>
+                                        </p:tgtEl>
+                                        <p:attrNameLst>
+                                          <p:attrName>style.visibility</p:attrName>
+                                        </p:attrNameLst>
+                                      </p:cBhvr>
+                                      <p:to>
+                                        <p:strVal val="visible"/>
+                                      </p:to>
+                                    </p:set>
+                                  </p:childTnLst>
+                                </p:cTn>
+                              </p:par>
+                              <p:par>
+                                <p:cTn id="7" presetID="1" presetClass="entr" presetSubtype="0" fill="hold" grpId="0" nodeType="withEffect">
+                                  <p:stCondLst>
+                                    <p:cond delay="0"/>
+                                  </p:stCondLst>
+                                  <p:childTnLst>
+                                    <p:set>
+                                      <p:cBhvr>
+                                        <p:cTn id="8" dur="1" fill="hold">
+                                          <p:stCondLst>
+                                            <p:cond delay="0"/>
+                                          </p:stCondLst>
+                                        </p:cTn>
+                                        <p:tgtEl>
+                                          <p:spTgt spid="3">
+                                            <p:txEl>
+                                              <p:pRg st="1" end="1"/>
+                                            </p:txEl>
+                                          </p:spTgt>
+                                        </p:tgtEl>
+                                        <p:attrNameLst>
+                                          <p:attrName>style.visibility</p:attrName>
+                                        </p:attrNameLst>
+                                      </p:cBhvr>
+                                      <p:to>
+                                        <p:strVal val="visible"/>
+                                      </p:to>
+                                    </p:set>
+                                  </p:childTnLst>
+                                </p:cTn>
+                              </p:par>
+                              <p:par>
+                                <p:cTn id="9" presetID="1" presetClass="entr" presetSubtype="0" fill="hold" grpId="0" nodeType="withEffect">
+                                  <p:stCondLst>
+                                    <p:cond delay="0"/>
+                                  </p:stCondLst>
+                                  <p:childTnLst>
+                                    <p:set>
+                                      <p:cBhvr>
+                                        <p:cTn id="10" dur="1" fill="hold">
+                                          <p:stCondLst>
+                                            <p:cond delay="0"/>
+                                          </p:stCondLst>
+                                        </p:cTn>
+                                        <p:tgtEl>
+                                          <p:spTgt spid="3">
+                                            <p:txEl>
+                                              <p:pRg st="2" end="2"/>
+                                            </p:txEl>
+                                          </p:spTgt>
+                                        </p:tgtEl>
+                                        <p:attrNameLst>
+                                          <p:attrName>style.visibility</p:attrName>
+                                        </p:attrNameLst>
+                                      </p:cBhvr>
+                                      <p:to>
+                                        <p:strVal val="visible"/>
+                                      </p:to>
+                                    </p:set>
+                                  </p:childTnLst>
+                                </p:cTn>
+                              </p:par>
+                            </p:childTnLst>
+                          </p:cTn>
+                        </p:par>
+                      </p:childTnLst>
+                    </p:cTn>
+                  </p:par>
+                  <p:par>
+                    <p:cTn id="11" fill="hold">
+                      <p:stCondLst>
+                        <p:cond delay="indefinite"/>
+                      </p:stCondLst>
+                      <p:childTnLst>
+                        <p:par>
+                          <p:cTn id="12" fill="hold">
+                            <p:stCondLst>
+                              <p:cond delay="0"/>
+                            </p:stCondLst>
+                            <p:childTnLst>
+                              <p:par>
+                                <p:cTn id="13" presetID="1" presetClass="entr" presetSubtype="0" fill="hold" grpId="0" nodeType="clickEffect">
+                                  <p:stCondLst>
+                                    <p:cond delay="0"/>
+                                  </p:stCondLst>
+                                  <p:childTnLst>
+                                    <p:set>
+                                      <p:cBhvr>
+                                        <p:cTn id="14" dur="1" fill="hold">
+                                          <p:stCondLst>
+                                            <p:cond delay="0"/>
+                                          </p:stCondLst>
+                                        </p:cTn>
+                                        <p:tgtEl>
+                                          <p:spTgt spid="3">
+                                            <p:txEl>
+                                              <p:pRg st="3" end="3"/>
+                                            </p:txEl>
+                                          </p:spTgt>
+                                        </p:tgtEl>
+                                        <p:attrNameLst>
+                                          <p:attrName>style.visibility</p:attrName>
+                                        </p:attrNameLst>
+                                      </p:cBhvr>
+                                      <p:to>
+                                        <p:strVal val="visible"/>
+                                      </p:to>
+                                    </p:set>
+                                  </p:childTnLst>
+                                </p:cTn>
+                              </p:par>
+                            </p:childTnLst>
+                          </p:cTn>
+                        </p:par>
+                      </p:childTnLst>
+                    </p:cTn>
+                  </p:par>
+                  <p:par>
+                    <p:cTn id="15" fill="hold">
+                      <p:stCondLst>
+                        <p:cond delay="indefinite"/>
+                      </p:stCondLst>
+                      <p:childTnLst>
+                        <p:par>
+                          <p:cTn id="16" fill="hold">
+                            <p:stCondLst>
+                              <p:cond delay="0"/>
+                            </p:stCondLst>
+                            <p:childTnLst>
+                              <p:par>
+                                <p:cTn id="17" presetID="1" presetClass="entr" presetSubtype="0" fill="hold" grpId="0" nodeType="clickEffect">
+                                  <p:stCondLst>
+                                    <p:cond delay="0"/>
+                                  </p:stCondLst>
+                                  <p:childTnLst>
+                                    <p:set>
+                                      <p:cBhvr>
+                                        <p:cTn id="18" dur="1" fill="hold">
+                                          <p:stCondLst>
+                                            <p:cond delay="0"/>
+                                          </p:stCondLst>
+                                        </p:cTn>
+                                        <p:tgtEl>
+                                          <p:spTgt spid="3">
+                                            <p:txEl>
+                                              <p:pRg st="4" end="4"/>
+                                            </p:txEl>
+                                          </p:spTgt>
+                                        </p:tgtEl>
+                                        <p:attrNameLst>
+                                          <p:attrName>style.visibility</p:attrName>
+                                        </p:attrNameLst>
+                                      </p:cBhvr>
+                                      <p:to>
+                                        <p:strVal val="visible"/>
+                                      </p:to>
+                                    </p:set>
+                                  </p:childTnLst>
+                                </p:cTn>
+                              </p:par>
+                            </p:childTnLst>
+                          </p:cTn>
+                        </p:par>
+                      </p:childTnLst>
+                    </p:cTn>
+                  </p:par>
+                  <p:par>
+                    <p:cTn id="19" fill="hold">
+                      <p:stCondLst>
+                        <p:cond delay="indefinite"/>
+                      </p:stCondLst>
+                      <p:childTnLst>
+                        <p:par>
+                          <p:cTn id="20" fill="hold">
+                            <p:stCondLst>
+                              <p:cond delay="0"/>
+                            </p:stCondLst>
+                            <p:childTnLst>
+                              <p:par>
+                                <p:cTn id="21" presetID="1" presetClass="entr" presetSubtype="0" fill="hold" grpId="0" nodeType="clickEffect">
+                                  <p:stCondLst>
+                                    <p:cond delay="0"/>
+                                  </p:stCondLst>
+                                  <p:childTnLst>
+                                    <p:set>
+                                      <p:cBhvr>
+                                        <p:cTn id="22" dur="1" fill="hold">
+                                          <p:stCondLst>
+                                            <p:cond delay="0"/>
+                                          </p:stCondLst>
+                                        </p:cTn>
+                                        <p:tgtEl>
+                                          <p:spTgt spid="3">
+                                            <p:txEl>
+                                              <p:pRg st="5" end="5"/>
+                                            </p:txEl>
+                                          </p:spTgt>
+                                        </p:tgtEl>
+                                        <p:attrNameLst>
+                                          <p:attrName>style.visibility</p:attrName>
+                                        </p:attrNameLst>
+                                      </p:cBhvr>
+                                      <p:to>
+                                        <p:strVal val="visible"/>
+                                      </p:to>
+                                    </p:set>
+                                  </p:childTnLst>
+                                </p:cTn>
+                              </p:par>
+                            </p:childTnLst>
+                          </p:cTn>
+                        </p:par>
+                      </p:childTnLst>
+                    </p:cTn>
+                  </p:par>
+                  <p:par>
+                    <p:cTn id="23" fill="hold">
+                      <p:stCondLst>
+                        <p:cond delay="indefinite"/>
+                      </p:stCondLst>
+                      <p:childTnLst>
+                        <p:par>
+                          <p:cTn id="24" fill="hold">
+                            <p:stCondLst>
+                              <p:cond delay="0"/>
+                            </p:stCondLst>
+                            <p:childTnLst>
+                              <p:par>
+                                <p:cTn id="25" presetID="1" presetClass="entr" presetSubtype="0" fill="hold" grpId="0" nodeType="clickEffect">
+                                  <p:stCondLst>
+                                    <p:cond delay="0"/>
+                                  </p:stCondLst>
+                                  <p:childTnLst>
+                                    <p:set>
+                                      <p:cBhvr>
+                                        <p:cTn id="26" dur="1" fill="hold">
+                                          <p:stCondLst>
+                                            <p:cond delay="0"/>
+                                          </p:stCondLst>
+                                        </p:cTn>
+                                        <p:tgtEl>
+                                          <p:spTgt spid="3">
+                                            <p:txEl>
+                                              <p:pRg st="6" end="6"/>
+                                            </p:txEl>
+                                          </p:spTgt>
+                                        </p:tgtEl>
+                                        <p:attrNameLst>
+                                          <p:attrName>style.visibility</p:attrName>
+                                        </p:attrNameLst>
+                                      </p:cBhvr>
+                                      <p:to>
+                                        <p:strVal val="visible"/>
+                                      </p:to>
+                                    </p:set>
+                                  </p:childTnLst>
+                                </p:cTn>
+                              </p:par>
+                            </p:childTnLst>
+                          </p:cTn>
+                        </p:par>
+                      </p:childTnLst>
+                    </p:cTn>
+                  </p:par>
+                </p:childTnLst>
+              </p:cTn>
+              <p:prevCondLst>
+                <p:cond evt="onPrev" delay="0">
+                  <p:tgtEl>
+                    <p:sldTgt/>
+                  </p:tgtEl>
+                </p:cond>
+              </p:prevCondLst>
+              <p:nextCondLst>
+                <p:cond evt="onNext" delay="0">
+                  <p:tgtEl>
+                    <p:sldTgt/>
+                  </p:tgtEl>
+                </p:cond>
+              </p:nextCondLst>
+            </p:seq>
+          </p:childTnLst>
+        </p:cTn>
+      </p:par>
+    </p:tnLst>
+    <p:bldLst>
+      <p:bldP spid="3" grpId="0" build="p"/>
+    </p:bldLst>
+  </p:timing>
+</p:sld>
+</file>
+
+<file path=ppt/slides/slide11.xml><?xml version="1.0" encoding="utf-8"?>
+<p:sld xmlns:a="http://schemas.openxmlformats.org/drawingml/2006/main" xmlns:r="http://schemas.openxmlformats.org/officeDocument/2006/relationships" xmlns:p="http://schemas.openxmlformats.org/presentationml/2006/main">
+  <p:cSld>
+    <p:spTree>
+      <p:nvGrpSpPr>
+        <p:cNvPr id="1" name=""/>
+        <p:cNvGrpSpPr/>
+        <p:nvPr/>
+      </p:nvGrpSpPr>
+      <p:grpSpPr>
+        <a:xfrm>
+          <a:off x="0" y="0"/>
+          <a:ext cx="0" cy="0"/>
+          <a:chOff x="0" y="0"/>
+          <a:chExt cx="0" cy="0"/>
+        </a:xfrm>
+      </p:grpSpPr>
       <p:pic>
         <p:nvPicPr>
           <p:cNvPr id="5" name="Content Placeholder 4" descr="A table with text on it&#10;&#10;Description automatically generated">
@@ -3764,7 +4259,7 @@
 </p:sld>
 </file>
 
-<file path=ppt/slides/slide11.xml><?xml version="1.0" encoding="utf-8"?>
+<file path=ppt/slides/slide12.xml><?xml version="1.0" encoding="utf-8"?>
 <p:sld xmlns:a="http://schemas.openxmlformats.org/drawingml/2006/main" xmlns:r="http://schemas.openxmlformats.org/officeDocument/2006/relationships" xmlns:p="http://schemas.openxmlformats.org/presentationml/2006/main">
   <p:cSld>
     <p:spTree>
@@ -4139,7 +4634,7 @@
 </p:sld>
 </file>
 
-<file path=ppt/slides/slide12.xml><?xml version="1.0" encoding="utf-8"?>
+<file path=ppt/slides/slide13.xml><?xml version="1.0" encoding="utf-8"?>
 <p:sld xmlns:a="http://schemas.openxmlformats.org/drawingml/2006/main" xmlns:r="http://schemas.openxmlformats.org/officeDocument/2006/relationships" xmlns:p="http://schemas.openxmlformats.org/presentationml/2006/main">
   <p:cSld>
     <p:spTree>
@@ -4253,6 +4748,140 @@
 </file>
 
 <file path=ppt/slides/slide2.xml><?xml version="1.0" encoding="utf-8"?>
+<p:sld xmlns:a="http://schemas.openxmlformats.org/drawingml/2006/main" xmlns:r="http://schemas.openxmlformats.org/officeDocument/2006/relationships" xmlns:p="http://schemas.openxmlformats.org/presentationml/2006/main">
+  <p:cSld>
+    <p:spTree>
+      <p:nvGrpSpPr>
+        <p:cNvPr id="1" name=""/>
+        <p:cNvGrpSpPr/>
+        <p:nvPr/>
+      </p:nvGrpSpPr>
+      <p:grpSpPr>
+        <a:xfrm>
+          <a:off x="0" y="0"/>
+          <a:ext cx="0" cy="0"/>
+          <a:chOff x="0" y="0"/>
+          <a:chExt cx="0" cy="0"/>
+        </a:xfrm>
+      </p:grpSpPr>
+      <p:sp>
+        <p:nvSpPr>
+          <p:cNvPr id="2" name="Title 1">
+            <a:extLst>
+              <a:ext uri="{FF2B5EF4-FFF2-40B4-BE49-F238E27FC236}">
+                <a16:creationId xmlns:a16="http://schemas.microsoft.com/office/drawing/2014/main" id="{7E39A656-2F72-1E4E-FE6D-97FA82733F60}"/>
+              </a:ext>
+            </a:extLst>
+          </p:cNvPr>
+          <p:cNvSpPr>
+            <a:spLocks noGrp="1"/>
+          </p:cNvSpPr>
+          <p:nvPr>
+            <p:ph type="title"/>
+          </p:nvPr>
+        </p:nvSpPr>
+        <p:spPr/>
+        <p:txBody>
+          <a:bodyPr/>
+          <a:lstStyle/>
+          <a:p>
+            <a:r>
+              <a:rPr lang="en-US" dirty="0"/>
+              <a:t>Me</a:t>
+            </a:r>
+          </a:p>
+        </p:txBody>
+      </p:sp>
+      <p:sp>
+        <p:nvSpPr>
+          <p:cNvPr id="3" name="Content Placeholder 2">
+            <a:extLst>
+              <a:ext uri="{FF2B5EF4-FFF2-40B4-BE49-F238E27FC236}">
+                <a16:creationId xmlns:a16="http://schemas.microsoft.com/office/drawing/2014/main" id="{20F9E3B5-D201-A50E-73E1-7235BC7AEF27}"/>
+              </a:ext>
+            </a:extLst>
+          </p:cNvPr>
+          <p:cNvSpPr>
+            <a:spLocks noGrp="1"/>
+          </p:cNvSpPr>
+          <p:nvPr>
+            <p:ph idx="1"/>
+          </p:nvPr>
+        </p:nvSpPr>
+        <p:spPr/>
+        <p:txBody>
+          <a:bodyPr/>
+          <a:lstStyle/>
+          <a:p>
+            <a:r>
+              <a:rPr lang="en-US" dirty="0"/>
+              <a:t>Dr. Ahmed Faris Al-</a:t>
+            </a:r>
+            <a:r>
+              <a:rPr lang="en-US" dirty="0" err="1"/>
+              <a:t>Refaie</a:t>
+            </a:r>
+            <a:endParaRPr lang="en-US" dirty="0"/>
+          </a:p>
+          <a:p>
+            <a:r>
+              <a:rPr lang="en-US" dirty="0"/>
+              <a:t>Department of Physics and Mathematics</a:t>
+            </a:r>
+          </a:p>
+          <a:p>
+            <a:r>
+              <a:rPr lang="en-US" dirty="0"/>
+              <a:t>Principal Research Fellow </a:t>
+            </a:r>
+          </a:p>
+          <a:p>
+            <a:r>
+              <a:rPr lang="en-US" dirty="0"/>
+              <a:t>Exoplanets</a:t>
+            </a:r>
+          </a:p>
+          <a:p>
+            <a:r>
+              <a:rPr lang="en-US" dirty="0"/>
+              <a:t>PhD in Molecular Dynamics</a:t>
+            </a:r>
+          </a:p>
+          <a:p>
+            <a:r>
+              <a:rPr lang="en-US" dirty="0"/>
+              <a:t>Email: </a:t>
+            </a:r>
+            <a:r>
+              <a:rPr lang="en-US" dirty="0">
+                <a:hlinkClick r:id="rId2"/>
+              </a:rPr>
+              <a:t>ahmed.al-refaie.12@ucl.ac.uk</a:t>
+            </a:r>
+            <a:endParaRPr lang="en-US" dirty="0"/>
+          </a:p>
+          <a:p>
+            <a:pPr marL="0" indent="0">
+              <a:buNone/>
+            </a:pPr>
+            <a:endParaRPr lang="en-US" dirty="0"/>
+          </a:p>
+        </p:txBody>
+      </p:sp>
+    </p:spTree>
+    <p:extLst>
+      <p:ext uri="{BB962C8B-B14F-4D97-AF65-F5344CB8AC3E}">
+        <p14:creationId xmlns:p14="http://schemas.microsoft.com/office/powerpoint/2010/main" val="308870080"/>
+      </p:ext>
+    </p:extLst>
+  </p:cSld>
+  <p:clrMapOvr>
+    <a:masterClrMapping/>
+  </p:clrMapOvr>
+</p:sld>
+</file>
+
+<file path=ppt/slides/slide3.xml><?xml version="1.0" encoding="utf-8"?>
 <p:sld xmlns:a="http://schemas.openxmlformats.org/drawingml/2006/main" xmlns:r="http://schemas.openxmlformats.org/officeDocument/2006/relationships" xmlns:p="http://schemas.openxmlformats.org/presentationml/2006/main">
   <p:cSld>
     <p:spTree>
@@ -4735,7 +5364,7 @@
 </p:sld>
 </file>
 
-<file path=ppt/slides/slide3.xml><?xml version="1.0" encoding="utf-8"?>
+<file path=ppt/slides/slide4.xml><?xml version="1.0" encoding="utf-8"?>
 <p:sld xmlns:a="http://schemas.openxmlformats.org/drawingml/2006/main" xmlns:r="http://schemas.openxmlformats.org/officeDocument/2006/relationships" xmlns:p="http://schemas.openxmlformats.org/presentationml/2006/main">
   <p:cSld>
     <p:spTree>
@@ -5323,7 +5952,7 @@
 </p:sld>
 </file>
 
-<file path=ppt/slides/slide4.xml><?xml version="1.0" encoding="utf-8"?>
+<file path=ppt/slides/slide5.xml><?xml version="1.0" encoding="utf-8"?>
 <p:sld xmlns:a="http://schemas.openxmlformats.org/drawingml/2006/main" xmlns:r="http://schemas.openxmlformats.org/officeDocument/2006/relationships" xmlns:p="http://schemas.openxmlformats.org/presentationml/2006/main">
   <p:cSld>
     <p:spTree>
@@ -5910,7 +6539,7 @@
 </p:sld>
 </file>
 
-<file path=ppt/slides/slide5.xml><?xml version="1.0" encoding="utf-8"?>
+<file path=ppt/slides/slide6.xml><?xml version="1.0" encoding="utf-8"?>
 <p:sld xmlns:a="http://schemas.openxmlformats.org/drawingml/2006/main" xmlns:r="http://schemas.openxmlformats.org/officeDocument/2006/relationships" xmlns:p="http://schemas.openxmlformats.org/presentationml/2006/main">
   <p:cSld>
     <p:spTree>
@@ -6435,7 +7064,7 @@
 </p:sld>
 </file>
 
-<file path=ppt/slides/slide6.xml><?xml version="1.0" encoding="utf-8"?>
+<file path=ppt/slides/slide7.xml><?xml version="1.0" encoding="utf-8"?>
 <p:sld xmlns:a="http://schemas.openxmlformats.org/drawingml/2006/main" xmlns:r="http://schemas.openxmlformats.org/officeDocument/2006/relationships" xmlns:p="http://schemas.openxmlformats.org/presentationml/2006/main">
   <p:cSld>
     <p:spTree>
@@ -6987,7 +7616,7 @@
 </p:sld>
 </file>
 
-<file path=ppt/slides/slide7.xml><?xml version="1.0" encoding="utf-8"?>
+<file path=ppt/slides/slide8.xml><?xml version="1.0" encoding="utf-8"?>
 <p:sld xmlns:a="http://schemas.openxmlformats.org/drawingml/2006/main" xmlns:r="http://schemas.openxmlformats.org/officeDocument/2006/relationships" xmlns:p="http://schemas.openxmlformats.org/presentationml/2006/main">
   <p:cSld>
     <p:spTree>
@@ -7232,7 +7861,7 @@
 </p:sld>
 </file>
 
-<file path=ppt/slides/slide8.xml><?xml version="1.0" encoding="utf-8"?>
+<file path=ppt/slides/slide9.xml><?xml version="1.0" encoding="utf-8"?>
 <p:sld xmlns:a="http://schemas.openxmlformats.org/drawingml/2006/main" xmlns:r="http://schemas.openxmlformats.org/officeDocument/2006/relationships" xmlns:p="http://schemas.openxmlformats.org/presentationml/2006/main">
   <p:cSld>
     <p:spTree>
@@ -7466,500 +8095,6 @@
         </p:cTn>
       </p:par>
     </p:tnLst>
-  </p:timing>
-</p:sld>
-</file>
-
-<file path=ppt/slides/slide9.xml><?xml version="1.0" encoding="utf-8"?>
-<p:sld xmlns:a="http://schemas.openxmlformats.org/drawingml/2006/main" xmlns:r="http://schemas.openxmlformats.org/officeDocument/2006/relationships" xmlns:p="http://schemas.openxmlformats.org/presentationml/2006/main">
-  <p:cSld>
-    <p:spTree>
-      <p:nvGrpSpPr>
-        <p:cNvPr id="1" name=""/>
-        <p:cNvGrpSpPr/>
-        <p:nvPr/>
-      </p:nvGrpSpPr>
-      <p:grpSpPr>
-        <a:xfrm>
-          <a:off x="0" y="0"/>
-          <a:ext cx="0" cy="0"/>
-          <a:chOff x="0" y="0"/>
-          <a:chExt cx="0" cy="0"/>
-        </a:xfrm>
-      </p:grpSpPr>
-      <p:sp>
-        <p:nvSpPr>
-          <p:cNvPr id="2" name="Title 1">
-            <a:extLst>
-              <a:ext uri="{FF2B5EF4-FFF2-40B4-BE49-F238E27FC236}">
-                <a16:creationId xmlns:a16="http://schemas.microsoft.com/office/drawing/2014/main" id="{C325B7C7-7599-801A-DEED-FB0A0A7953BE}"/>
-              </a:ext>
-            </a:extLst>
-          </p:cNvPr>
-          <p:cNvSpPr>
-            <a:spLocks noGrp="1"/>
-          </p:cNvSpPr>
-          <p:nvPr>
-            <p:ph type="title"/>
-          </p:nvPr>
-        </p:nvSpPr>
-        <p:spPr/>
-        <p:txBody>
-          <a:bodyPr/>
-          <a:lstStyle/>
-          <a:p>
-            <a:r>
-              <a:rPr lang="en-US" dirty="0"/>
-              <a:t>Course structure</a:t>
-            </a:r>
-          </a:p>
-        </p:txBody>
-      </p:sp>
-      <p:sp>
-        <p:nvSpPr>
-          <p:cNvPr id="3" name="Content Placeholder 2">
-            <a:extLst>
-              <a:ext uri="{FF2B5EF4-FFF2-40B4-BE49-F238E27FC236}">
-                <a16:creationId xmlns:a16="http://schemas.microsoft.com/office/drawing/2014/main" id="{55B83267-B33C-B929-8DA0-22CE6B5FCDED}"/>
-              </a:ext>
-            </a:extLst>
-          </p:cNvPr>
-          <p:cNvSpPr>
-            <a:spLocks noGrp="1"/>
-          </p:cNvSpPr>
-          <p:nvPr>
-            <p:ph idx="1"/>
-          </p:nvPr>
-        </p:nvSpPr>
-        <p:spPr/>
-        <p:txBody>
-          <a:bodyPr/>
-          <a:lstStyle/>
-          <a:p>
-            <a:r>
-              <a:rPr lang="en-US" dirty="0"/>
-              <a:t>We will be using </a:t>
-            </a:r>
-            <a:r>
-              <a:rPr lang="en-US" dirty="0" err="1"/>
-              <a:t>JupyterLab</a:t>
-            </a:r>
-            <a:r>
-              <a:rPr lang="en-US" dirty="0"/>
-              <a:t> up until day 4.</a:t>
-            </a:r>
-          </a:p>
-          <a:p>
-            <a:pPr lvl="1"/>
-            <a:r>
-              <a:rPr lang="en-US" dirty="0"/>
-              <a:t>Either </a:t>
-            </a:r>
-            <a:r>
-              <a:rPr lang="en-US" dirty="0" err="1"/>
-              <a:t>Pyodide</a:t>
-            </a:r>
-            <a:r>
-              <a:rPr lang="en-US" dirty="0"/>
-              <a:t> or your own install can be used</a:t>
-            </a:r>
-          </a:p>
-          <a:p>
-            <a:pPr lvl="1"/>
-            <a:r>
-              <a:rPr lang="en-US" dirty="0"/>
-              <a:t>All but 2 notebooks work using </a:t>
-            </a:r>
-            <a:r>
-              <a:rPr lang="en-US" dirty="0" err="1"/>
-              <a:t>pyodide</a:t>
-            </a:r>
-            <a:r>
-              <a:rPr lang="en-US" dirty="0"/>
-              <a:t>.</a:t>
-            </a:r>
-          </a:p>
-          <a:p>
-            <a:r>
-              <a:rPr lang="en-US" dirty="0"/>
-              <a:t>From day 4 we will teach project development.</a:t>
-            </a:r>
-          </a:p>
-          <a:p>
-            <a:r>
-              <a:rPr lang="en-US" dirty="0"/>
-              <a:t>Last day we will build a project from scratch.</a:t>
-            </a:r>
-          </a:p>
-          <a:p>
-            <a:r>
-              <a:rPr lang="en-US" dirty="0"/>
-              <a:t>Each day except the last will have a 30 minute question session at the end.</a:t>
-            </a:r>
-          </a:p>
-          <a:p>
-            <a:r>
-              <a:rPr lang="en-US" dirty="0"/>
-              <a:t>Schedule is flexible depending on demand for certain topics.</a:t>
-            </a:r>
-          </a:p>
-          <a:p>
-            <a:endParaRPr lang="en-US" dirty="0"/>
-          </a:p>
-          <a:p>
-            <a:endParaRPr lang="en-US" dirty="0"/>
-          </a:p>
-        </p:txBody>
-      </p:sp>
-    </p:spTree>
-    <p:extLst>
-      <p:ext uri="{BB962C8B-B14F-4D97-AF65-F5344CB8AC3E}">
-        <p14:creationId xmlns:p14="http://schemas.microsoft.com/office/powerpoint/2010/main" val="591396260"/>
-      </p:ext>
-    </p:extLst>
-  </p:cSld>
-  <p:clrMapOvr>
-    <a:masterClrMapping/>
-  </p:clrMapOvr>
-  <p:timing>
-    <p:tnLst>
-      <p:par>
-        <p:cTn id="1" dur="indefinite" restart="never" nodeType="tmRoot">
-          <p:childTnLst>
-            <p:seq concurrent="1" nextAc="seek">
-              <p:cTn id="2" dur="indefinite" nodeType="mainSeq">
-                <p:childTnLst>
-                  <p:par>
-                    <p:cTn id="3" fill="hold">
-                      <p:stCondLst>
-                        <p:cond delay="indefinite"/>
-                      </p:stCondLst>
-                      <p:childTnLst>
-                        <p:par>
-                          <p:cTn id="4" fill="hold">
-                            <p:stCondLst>
-                              <p:cond delay="0"/>
-                            </p:stCondLst>
-                            <p:childTnLst>
-                              <p:par>
-                                <p:cTn id="5" presetID="1" presetClass="entr" presetSubtype="0" fill="hold" grpId="0" nodeType="clickEffect">
-                                  <p:stCondLst>
-                                    <p:cond delay="0"/>
-                                  </p:stCondLst>
-                                  <p:childTnLst>
-                                    <p:set>
-                                      <p:cBhvr>
-                                        <p:cTn id="6" dur="1" fill="hold">
-                                          <p:stCondLst>
-                                            <p:cond delay="0"/>
-                                          </p:stCondLst>
-                                        </p:cTn>
-                                        <p:tgtEl>
-                                          <p:spTgt spid="3">
-                                            <p:txEl>
-                                              <p:pRg st="0" end="0"/>
-                                            </p:txEl>
-                                          </p:spTgt>
-                                        </p:tgtEl>
-                                        <p:attrNameLst>
-                                          <p:attrName>style.visibility</p:attrName>
-                                        </p:attrNameLst>
-                                      </p:cBhvr>
-                                      <p:to>
-                                        <p:strVal val="visible"/>
-                                      </p:to>
-                                    </p:set>
-                                  </p:childTnLst>
-                                </p:cTn>
-                              </p:par>
-                              <p:par>
-                                <p:cTn id="7" presetID="1" presetClass="entr" presetSubtype="0" fill="hold" grpId="0" nodeType="withEffect">
-                                  <p:stCondLst>
-                                    <p:cond delay="0"/>
-                                  </p:stCondLst>
-                                  <p:childTnLst>
-                                    <p:set>
-                                      <p:cBhvr>
-                                        <p:cTn id="8" dur="1" fill="hold">
-                                          <p:stCondLst>
-                                            <p:cond delay="0"/>
-                                          </p:stCondLst>
-                                        </p:cTn>
-                                        <p:tgtEl>
-                                          <p:spTgt spid="3">
-                                            <p:txEl>
-                                              <p:pRg st="1" end="1"/>
-                                            </p:txEl>
-                                          </p:spTgt>
-                                        </p:tgtEl>
-                                        <p:attrNameLst>
-                                          <p:attrName>style.visibility</p:attrName>
-                                        </p:attrNameLst>
-                                      </p:cBhvr>
-                                      <p:to>
-                                        <p:strVal val="visible"/>
-                                      </p:to>
-                                    </p:set>
-                                  </p:childTnLst>
-                                </p:cTn>
-                              </p:par>
-                              <p:par>
-                                <p:cTn id="9" presetID="1" presetClass="entr" presetSubtype="0" fill="hold" grpId="0" nodeType="withEffect">
-                                  <p:stCondLst>
-                                    <p:cond delay="0"/>
-                                  </p:stCondLst>
-                                  <p:childTnLst>
-                                    <p:set>
-                                      <p:cBhvr>
-                                        <p:cTn id="10" dur="1" fill="hold">
-                                          <p:stCondLst>
-                                            <p:cond delay="0"/>
-                                          </p:stCondLst>
-                                        </p:cTn>
-                                        <p:tgtEl>
-                                          <p:spTgt spid="3">
-                                            <p:txEl>
-                                              <p:pRg st="2" end="2"/>
-                                            </p:txEl>
-                                          </p:spTgt>
-                                        </p:tgtEl>
-                                        <p:attrNameLst>
-                                          <p:attrName>style.visibility</p:attrName>
-                                        </p:attrNameLst>
-                                      </p:cBhvr>
-                                      <p:to>
-                                        <p:strVal val="visible"/>
-                                      </p:to>
-                                    </p:set>
-                                  </p:childTnLst>
-                                </p:cTn>
-                              </p:par>
-                            </p:childTnLst>
-                          </p:cTn>
-                        </p:par>
-                      </p:childTnLst>
-                    </p:cTn>
-                  </p:par>
-                  <p:par>
-                    <p:cTn id="11" fill="hold">
-                      <p:stCondLst>
-                        <p:cond delay="indefinite"/>
-                      </p:stCondLst>
-                      <p:childTnLst>
-                        <p:par>
-                          <p:cTn id="12" fill="hold">
-                            <p:stCondLst>
-                              <p:cond delay="0"/>
-                            </p:stCondLst>
-                            <p:childTnLst>
-                              <p:par>
-                                <p:cTn id="13" presetID="1" presetClass="entr" presetSubtype="0" fill="hold" grpId="0" nodeType="clickEffect">
-                                  <p:stCondLst>
-                                    <p:cond delay="0"/>
-                                  </p:stCondLst>
-                                  <p:childTnLst>
-                                    <p:set>
-                                      <p:cBhvr>
-                                        <p:cTn id="14" dur="1" fill="hold">
-                                          <p:stCondLst>
-                                            <p:cond delay="0"/>
-                                          </p:stCondLst>
-                                        </p:cTn>
-                                        <p:tgtEl>
-                                          <p:spTgt spid="3">
-                                            <p:txEl>
-                                              <p:pRg st="3" end="3"/>
-                                            </p:txEl>
-                                          </p:spTgt>
-                                        </p:tgtEl>
-                                        <p:attrNameLst>
-                                          <p:attrName>style.visibility</p:attrName>
-                                        </p:attrNameLst>
-                                      </p:cBhvr>
-                                      <p:to>
-                                        <p:strVal val="visible"/>
-                                      </p:to>
-                                    </p:set>
-                                  </p:childTnLst>
-                                </p:cTn>
-                              </p:par>
-                            </p:childTnLst>
-                          </p:cTn>
-                        </p:par>
-                      </p:childTnLst>
-                    </p:cTn>
-                  </p:par>
-                  <p:par>
-                    <p:cTn id="15" fill="hold">
-                      <p:stCondLst>
-                        <p:cond delay="indefinite"/>
-                      </p:stCondLst>
-                      <p:childTnLst>
-                        <p:par>
-                          <p:cTn id="16" fill="hold">
-                            <p:stCondLst>
-                              <p:cond delay="0"/>
-                            </p:stCondLst>
-                            <p:childTnLst>
-                              <p:par>
-                                <p:cTn id="17" presetID="1" presetClass="entr" presetSubtype="0" fill="hold" grpId="0" nodeType="clickEffect">
-                                  <p:stCondLst>
-                                    <p:cond delay="0"/>
-                                  </p:stCondLst>
-                                  <p:childTnLst>
-                                    <p:set>
-                                      <p:cBhvr>
-                                        <p:cTn id="18" dur="1" fill="hold">
-                                          <p:stCondLst>
-                                            <p:cond delay="0"/>
-                                          </p:stCondLst>
-                                        </p:cTn>
-                                        <p:tgtEl>
-                                          <p:spTgt spid="3">
-                                            <p:txEl>
-                                              <p:pRg st="4" end="4"/>
-                                            </p:txEl>
-                                          </p:spTgt>
-                                        </p:tgtEl>
-                                        <p:attrNameLst>
-                                          <p:attrName>style.visibility</p:attrName>
-                                        </p:attrNameLst>
-                                      </p:cBhvr>
-                                      <p:to>
-                                        <p:strVal val="visible"/>
-                                      </p:to>
-                                    </p:set>
-                                  </p:childTnLst>
-                                </p:cTn>
-                              </p:par>
-                            </p:childTnLst>
-                          </p:cTn>
-                        </p:par>
-                      </p:childTnLst>
-                    </p:cTn>
-                  </p:par>
-                  <p:par>
-                    <p:cTn id="19" fill="hold">
-                      <p:stCondLst>
-                        <p:cond delay="indefinite"/>
-                      </p:stCondLst>
-                      <p:childTnLst>
-                        <p:par>
-                          <p:cTn id="20" fill="hold">
-                            <p:stCondLst>
-                              <p:cond delay="0"/>
-                            </p:stCondLst>
-                            <p:childTnLst>
-                              <p:par>
-                                <p:cTn id="21" presetID="1" presetClass="entr" presetSubtype="0" fill="hold" grpId="0" nodeType="clickEffect">
-                                  <p:stCondLst>
-                                    <p:cond delay="0"/>
-                                  </p:stCondLst>
-                                  <p:childTnLst>
-                                    <p:set>
-                                      <p:cBhvr>
-                                        <p:cTn id="22" dur="1" fill="hold">
-                                          <p:stCondLst>
-                                            <p:cond delay="0"/>
-                                          </p:stCondLst>
-                                        </p:cTn>
-                                        <p:tgtEl>
-                                          <p:spTgt spid="3">
-                                            <p:txEl>
-                                              <p:pRg st="5" end="5"/>
-                                            </p:txEl>
-                                          </p:spTgt>
-                                        </p:tgtEl>
-                                        <p:attrNameLst>
-                                          <p:attrName>style.visibility</p:attrName>
-                                        </p:attrNameLst>
-                                      </p:cBhvr>
-                                      <p:to>
-                                        <p:strVal val="visible"/>
-                                      </p:to>
-                                    </p:set>
-                                  </p:childTnLst>
-                                </p:cTn>
-                              </p:par>
-                            </p:childTnLst>
-                          </p:cTn>
-                        </p:par>
-                      </p:childTnLst>
-                    </p:cTn>
-                  </p:par>
-                  <p:par>
-                    <p:cTn id="23" fill="hold">
-                      <p:stCondLst>
-                        <p:cond delay="indefinite"/>
-                      </p:stCondLst>
-                      <p:childTnLst>
-                        <p:par>
-                          <p:cTn id="24" fill="hold">
-                            <p:stCondLst>
-                              <p:cond delay="0"/>
-                            </p:stCondLst>
-                            <p:childTnLst>
-                              <p:par>
-                                <p:cTn id="25" presetID="1" presetClass="entr" presetSubtype="0" fill="hold" grpId="0" nodeType="clickEffect">
-                                  <p:stCondLst>
-                                    <p:cond delay="0"/>
-                                  </p:stCondLst>
-                                  <p:childTnLst>
-                                    <p:set>
-                                      <p:cBhvr>
-                                        <p:cTn id="26" dur="1" fill="hold">
-                                          <p:stCondLst>
-                                            <p:cond delay="0"/>
-                                          </p:stCondLst>
-                                        </p:cTn>
-                                        <p:tgtEl>
-                                          <p:spTgt spid="3">
-                                            <p:txEl>
-                                              <p:pRg st="6" end="6"/>
-                                            </p:txEl>
-                                          </p:spTgt>
-                                        </p:tgtEl>
-                                        <p:attrNameLst>
-                                          <p:attrName>style.visibility</p:attrName>
-                                        </p:attrNameLst>
-                                      </p:cBhvr>
-                                      <p:to>
-                                        <p:strVal val="visible"/>
-                                      </p:to>
-                                    </p:set>
-                                  </p:childTnLst>
-                                </p:cTn>
-                              </p:par>
-                            </p:childTnLst>
-                          </p:cTn>
-                        </p:par>
-                      </p:childTnLst>
-                    </p:cTn>
-                  </p:par>
-                </p:childTnLst>
-              </p:cTn>
-              <p:prevCondLst>
-                <p:cond evt="onPrev" delay="0">
-                  <p:tgtEl>
-                    <p:sldTgt/>
-                  </p:tgtEl>
-                </p:cond>
-              </p:prevCondLst>
-              <p:nextCondLst>
-                <p:cond evt="onNext" delay="0">
-                  <p:tgtEl>
-                    <p:sldTgt/>
-                  </p:tgtEl>
-                </p:cond>
-              </p:nextCondLst>
-            </p:seq>
-          </p:childTnLst>
-        </p:cTn>
-      </p:par>
-    </p:tnLst>
-    <p:bldLst>
-      <p:bldP spid="3" grpId="0" build="p"/>
-    </p:bldLst>
   </p:timing>
 </p:sld>
 </file>

</xml_diff>